<commit_message>
data eye creation added
</commit_message>
<xml_diff>
--- a/images/images.pptx
+++ b/images/images.pptx
@@ -9,7 +9,8 @@
     <p:sldId id="261" r:id="rId3"/>
     <p:sldId id="258" r:id="rId4"/>
     <p:sldId id="262" r:id="rId5"/>
-    <p:sldId id="263" r:id="rId6"/>
+    <p:sldId id="264" r:id="rId6"/>
+    <p:sldId id="263" r:id="rId7"/>
   </p:sldIdLst>
   <p:sldSz cx="12192000" cy="6858000"/>
   <p:notesSz cx="6858000" cy="9144000"/>
@@ -289,7 +290,7 @@
           <a:p>
             <a:fld id="{79B32930-E64A-4C15-BE82-E9B63F26C808}" type="datetimeFigureOut">
               <a:rPr lang="de-DE" smtClean="0"/>
-              <a:t>03.04.2021</a:t>
+              <a:t>13.04.2021</a:t>
             </a:fld>
             <a:endParaRPr lang="de-DE"/>
           </a:p>
@@ -487,7 +488,7 @@
           <a:p>
             <a:fld id="{79B32930-E64A-4C15-BE82-E9B63F26C808}" type="datetimeFigureOut">
               <a:rPr lang="de-DE" smtClean="0"/>
-              <a:t>03.04.2021</a:t>
+              <a:t>13.04.2021</a:t>
             </a:fld>
             <a:endParaRPr lang="de-DE"/>
           </a:p>
@@ -695,7 +696,7 @@
           <a:p>
             <a:fld id="{79B32930-E64A-4C15-BE82-E9B63F26C808}" type="datetimeFigureOut">
               <a:rPr lang="de-DE" smtClean="0"/>
-              <a:t>03.04.2021</a:t>
+              <a:t>13.04.2021</a:t>
             </a:fld>
             <a:endParaRPr lang="de-DE"/>
           </a:p>
@@ -893,7 +894,7 @@
           <a:p>
             <a:fld id="{79B32930-E64A-4C15-BE82-E9B63F26C808}" type="datetimeFigureOut">
               <a:rPr lang="de-DE" smtClean="0"/>
-              <a:t>03.04.2021</a:t>
+              <a:t>13.04.2021</a:t>
             </a:fld>
             <a:endParaRPr lang="de-DE"/>
           </a:p>
@@ -1168,7 +1169,7 @@
           <a:p>
             <a:fld id="{79B32930-E64A-4C15-BE82-E9B63F26C808}" type="datetimeFigureOut">
               <a:rPr lang="de-DE" smtClean="0"/>
-              <a:t>03.04.2021</a:t>
+              <a:t>13.04.2021</a:t>
             </a:fld>
             <a:endParaRPr lang="de-DE"/>
           </a:p>
@@ -1433,7 +1434,7 @@
           <a:p>
             <a:fld id="{79B32930-E64A-4C15-BE82-E9B63F26C808}" type="datetimeFigureOut">
               <a:rPr lang="de-DE" smtClean="0"/>
-              <a:t>03.04.2021</a:t>
+              <a:t>13.04.2021</a:t>
             </a:fld>
             <a:endParaRPr lang="de-DE"/>
           </a:p>
@@ -1845,7 +1846,7 @@
           <a:p>
             <a:fld id="{79B32930-E64A-4C15-BE82-E9B63F26C808}" type="datetimeFigureOut">
               <a:rPr lang="de-DE" smtClean="0"/>
-              <a:t>03.04.2021</a:t>
+              <a:t>13.04.2021</a:t>
             </a:fld>
             <a:endParaRPr lang="de-DE"/>
           </a:p>
@@ -1986,7 +1987,7 @@
           <a:p>
             <a:fld id="{79B32930-E64A-4C15-BE82-E9B63F26C808}" type="datetimeFigureOut">
               <a:rPr lang="de-DE" smtClean="0"/>
-              <a:t>03.04.2021</a:t>
+              <a:t>13.04.2021</a:t>
             </a:fld>
             <a:endParaRPr lang="de-DE"/>
           </a:p>
@@ -2099,7 +2100,7 @@
           <a:p>
             <a:fld id="{79B32930-E64A-4C15-BE82-E9B63F26C808}" type="datetimeFigureOut">
               <a:rPr lang="de-DE" smtClean="0"/>
-              <a:t>03.04.2021</a:t>
+              <a:t>13.04.2021</a:t>
             </a:fld>
             <a:endParaRPr lang="de-DE"/>
           </a:p>
@@ -2410,7 +2411,7 @@
           <a:p>
             <a:fld id="{79B32930-E64A-4C15-BE82-E9B63F26C808}" type="datetimeFigureOut">
               <a:rPr lang="de-DE" smtClean="0"/>
-              <a:t>03.04.2021</a:t>
+              <a:t>13.04.2021</a:t>
             </a:fld>
             <a:endParaRPr lang="de-DE"/>
           </a:p>
@@ -2698,7 +2699,7 @@
           <a:p>
             <a:fld id="{79B32930-E64A-4C15-BE82-E9B63F26C808}" type="datetimeFigureOut">
               <a:rPr lang="de-DE" smtClean="0"/>
-              <a:t>03.04.2021</a:t>
+              <a:t>13.04.2021</a:t>
             </a:fld>
             <a:endParaRPr lang="de-DE"/>
           </a:p>
@@ -2939,7 +2940,7 @@
           <a:p>
             <a:fld id="{79B32930-E64A-4C15-BE82-E9B63F26C808}" type="datetimeFigureOut">
               <a:rPr lang="de-DE" smtClean="0"/>
-              <a:t>03.04.2021</a:t>
+              <a:t>13.04.2021</a:t>
             </a:fld>
             <a:endParaRPr lang="de-DE"/>
           </a:p>
@@ -4814,6 +4815,152 @@
       </p:grpSpPr>
       <p:grpSp>
         <p:nvGrpSpPr>
+          <p:cNvPr id="6" name="Gruppieren 5">
+            <a:extLst>
+              <a:ext uri="{FF2B5EF4-FFF2-40B4-BE49-F238E27FC236}">
+                <a16:creationId xmlns:a16="http://schemas.microsoft.com/office/drawing/2014/main" id="{591082FE-1D6F-43DB-8D9C-1EC83C3DA9C9}"/>
+              </a:ext>
+            </a:extLst>
+          </p:cNvPr>
+          <p:cNvGrpSpPr/>
+          <p:nvPr/>
+        </p:nvGrpSpPr>
+        <p:grpSpPr>
+          <a:xfrm>
+            <a:off x="539552" y="1602656"/>
+            <a:ext cx="8136904" cy="3986583"/>
+            <a:chOff x="539552" y="1602656"/>
+            <a:chExt cx="8136904" cy="3986583"/>
+          </a:xfrm>
+        </p:grpSpPr>
+        <p:pic>
+          <p:nvPicPr>
+            <p:cNvPr id="4" name="Grafik 3">
+              <a:extLst>
+                <a:ext uri="{FF2B5EF4-FFF2-40B4-BE49-F238E27FC236}">
+                  <a16:creationId xmlns:a16="http://schemas.microsoft.com/office/drawing/2014/main" id="{683BF534-7B73-4BA5-8759-9EC37DD322F8}"/>
+                </a:ext>
+              </a:extLst>
+            </p:cNvPr>
+            <p:cNvPicPr/>
+            <p:nvPr/>
+          </p:nvPicPr>
+          <p:blipFill rotWithShape="1">
+            <a:blip r:embed="rId2" cstate="print">
+              <a:clrChange>
+                <a:clrFrom>
+                  <a:srgbClr val="E4DEDA"/>
+                </a:clrFrom>
+                <a:clrTo>
+                  <a:srgbClr val="E4DEDA">
+                    <a:alpha val="0"/>
+                  </a:srgbClr>
+                </a:clrTo>
+              </a:clrChange>
+              <a:extLst>
+                <a:ext uri="{28A0092B-C50C-407E-A947-70E740481C1C}">
+                  <a14:useLocalDpi xmlns:a14="http://schemas.microsoft.com/office/drawing/2010/main" val="0"/>
+                </a:ext>
+              </a:extLst>
+            </a:blip>
+            <a:srcRect/>
+            <a:stretch/>
+          </p:blipFill>
+          <p:spPr bwMode="auto">
+            <a:xfrm>
+              <a:off x="539552" y="1602656"/>
+              <a:ext cx="8136904" cy="3986583"/>
+            </a:xfrm>
+            <a:prstGeom prst="rect">
+              <a:avLst/>
+            </a:prstGeom>
+            <a:ln>
+              <a:noFill/>
+            </a:ln>
+            <a:extLst>
+              <a:ext uri="{53640926-AAD7-44D8-BBD7-CCE9431645EC}">
+                <a14:shadowObscured xmlns:a14="http://schemas.microsoft.com/office/drawing/2010/main"/>
+              </a:ext>
+            </a:extLst>
+          </p:spPr>
+        </p:pic>
+        <p:sp>
+          <p:nvSpPr>
+            <p:cNvPr id="5" name="Textfeld 4">
+              <a:extLst>
+                <a:ext uri="{FF2B5EF4-FFF2-40B4-BE49-F238E27FC236}">
+                  <a16:creationId xmlns:a16="http://schemas.microsoft.com/office/drawing/2014/main" id="{39C80F2F-2797-4417-A66D-AD6702ABEB13}"/>
+                </a:ext>
+              </a:extLst>
+            </p:cNvPr>
+            <p:cNvSpPr txBox="1"/>
+            <p:nvPr/>
+          </p:nvSpPr>
+          <p:spPr>
+            <a:xfrm>
+              <a:off x="6156176" y="4706560"/>
+              <a:ext cx="2232249" cy="738664"/>
+            </a:xfrm>
+            <a:prstGeom prst="rect">
+              <a:avLst/>
+            </a:prstGeom>
+            <a:noFill/>
+          </p:spPr>
+          <p:txBody>
+            <a:bodyPr wrap="square" rtlCol="0">
+              <a:spAutoFit/>
+            </a:bodyPr>
+            <a:lstStyle/>
+            <a:p>
+              <a:r>
+                <a:rPr lang="en-US" sz="1400" dirty="0"/>
+                <a:t>Source: </a:t>
+              </a:r>
+              <a:r>
+                <a:rPr lang="en-US" sz="1400" b="1" dirty="0"/>
+                <a:t>Tektronix Primer </a:t>
+              </a:r>
+              <a:r>
+                <a:rPr lang="en-US" sz="1400" dirty="0"/>
+                <a:t>„Understanding and Characterizing Timing Jitter“</a:t>
+              </a:r>
+              <a:endParaRPr lang="de-DE" sz="1400" dirty="0"/>
+            </a:p>
+          </p:txBody>
+        </p:sp>
+      </p:grpSp>
+    </p:spTree>
+    <p:extLst>
+      <p:ext uri="{BB962C8B-B14F-4D97-AF65-F5344CB8AC3E}">
+        <p14:creationId xmlns:p14="http://schemas.microsoft.com/office/powerpoint/2010/main" val="4233037540"/>
+      </p:ext>
+    </p:extLst>
+  </p:cSld>
+  <p:clrMapOvr>
+    <a:masterClrMapping/>
+  </p:clrMapOvr>
+</p:sld>
+</file>
+
+<file path=ppt/slides/slide6.xml><?xml version="1.0" encoding="utf-8"?>
+<p:sld xmlns:a="http://schemas.openxmlformats.org/drawingml/2006/main" xmlns:r="http://schemas.openxmlformats.org/officeDocument/2006/relationships" xmlns:p="http://schemas.openxmlformats.org/presentationml/2006/main">
+  <p:cSld>
+    <p:spTree>
+      <p:nvGrpSpPr>
+        <p:cNvPr id="1" name=""/>
+        <p:cNvGrpSpPr/>
+        <p:nvPr/>
+      </p:nvGrpSpPr>
+      <p:grpSpPr>
+        <a:xfrm>
+          <a:off x="0" y="0"/>
+          <a:ext cx="0" cy="0"/>
+          <a:chOff x="0" y="0"/>
+          <a:chExt cx="0" cy="0"/>
+        </a:xfrm>
+      </p:grpSpPr>
+      <p:grpSp>
+        <p:nvGrpSpPr>
           <p:cNvPr id="12" name="Gruppieren 11">
             <a:extLst>
               <a:ext uri="{FF2B5EF4-FFF2-40B4-BE49-F238E27FC236}">

</xml_diff>